<commit_message>
Added a search all feature in the dropbox.
Not entirely necessary, but a nice addition.
</commit_message>
<xml_diff>
--- a/rapla-source-1.8.2/Enhancement Artifacts/Rapla Presentation.pptx
+++ b/rapla-source-1.8.2/Enhancement Artifacts/Rapla Presentation.pptx
@@ -17,9 +17,10 @@
     <p:sldId id="264" r:id="rId11"/>
     <p:sldId id="265" r:id="rId12"/>
     <p:sldId id="266" r:id="rId13"/>
-    <p:sldId id="270" r:id="rId14"/>
-    <p:sldId id="271" r:id="rId15"/>
-    <p:sldId id="272" r:id="rId16"/>
+    <p:sldId id="274" r:id="rId14"/>
+    <p:sldId id="270" r:id="rId15"/>
+    <p:sldId id="271" r:id="rId16"/>
+    <p:sldId id="272" r:id="rId17"/>
   </p:sldIdLst>
   <p:sldSz cx="12192000" cy="6858000"/>
   <p:notesSz cx="6858000" cy="9144000"/>
@@ -118,6 +119,11 @@
       </a:defRPr>
     </a:lvl9pPr>
   </p:defaultTextStyle>
+  <p:extLst>
+    <p:ext uri="{EFAFB233-063F-42B5-8137-9DF3F51BA10A}">
+      <p15:sldGuideLst xmlns:p15="http://schemas.microsoft.com/office/powerpoint/2012/main"/>
+    </p:ext>
+  </p:extLst>
 </p:presentation>
 </file>
 
@@ -291,7 +297,7 @@
           <a:p>
             <a:fld id="{7A0D676A-78C6-B44A-97A2-2446764EF6A7}" type="datetimeFigureOut">
               <a:rPr lang="en-US" smtClean="0"/>
-              <a:t>12/8/15</a:t>
+              <a:t>12/9/15</a:t>
             </a:fld>
             <a:endParaRPr lang="en-US"/>
           </a:p>
@@ -558,7 +564,7 @@
           <a:p>
             <a:fld id="{7A0D676A-78C6-B44A-97A2-2446764EF6A7}" type="datetimeFigureOut">
               <a:rPr lang="en-US" smtClean="0"/>
-              <a:t>12/8/15</a:t>
+              <a:t>12/9/15</a:t>
             </a:fld>
             <a:endParaRPr lang="en-US"/>
           </a:p>
@@ -789,7 +795,7 @@
           <a:p>
             <a:fld id="{7A0D676A-78C6-B44A-97A2-2446764EF6A7}" type="datetimeFigureOut">
               <a:rPr lang="en-US" smtClean="0"/>
-              <a:t>12/8/15</a:t>
+              <a:t>12/9/15</a:t>
             </a:fld>
             <a:endParaRPr lang="en-US"/>
           </a:p>
@@ -1099,7 +1105,7 @@
           <a:p>
             <a:fld id="{7A0D676A-78C6-B44A-97A2-2446764EF6A7}" type="datetimeFigureOut">
               <a:rPr lang="en-US" smtClean="0"/>
-              <a:t>12/8/15</a:t>
+              <a:t>12/9/15</a:t>
             </a:fld>
             <a:endParaRPr lang="en-US"/>
           </a:p>
@@ -1572,7 +1578,7 @@
           <a:p>
             <a:fld id="{7A0D676A-78C6-B44A-97A2-2446764EF6A7}" type="datetimeFigureOut">
               <a:rPr lang="en-US" smtClean="0"/>
-              <a:t>12/8/15</a:t>
+              <a:t>12/9/15</a:t>
             </a:fld>
             <a:endParaRPr lang="en-US"/>
           </a:p>
@@ -2119,7 +2125,7 @@
           <a:p>
             <a:fld id="{7A0D676A-78C6-B44A-97A2-2446764EF6A7}" type="datetimeFigureOut">
               <a:rPr lang="en-US" smtClean="0"/>
-              <a:t>12/8/15</a:t>
+              <a:t>12/9/15</a:t>
             </a:fld>
             <a:endParaRPr lang="en-US"/>
           </a:p>
@@ -2893,7 +2899,7 @@
           <a:p>
             <a:fld id="{7A0D676A-78C6-B44A-97A2-2446764EF6A7}" type="datetimeFigureOut">
               <a:rPr lang="en-US" smtClean="0"/>
-              <a:t>12/8/15</a:t>
+              <a:t>12/9/15</a:t>
             </a:fld>
             <a:endParaRPr lang="en-US"/>
           </a:p>
@@ -3068,7 +3074,7 @@
           <a:p>
             <a:fld id="{7A0D676A-78C6-B44A-97A2-2446764EF6A7}" type="datetimeFigureOut">
               <a:rPr lang="en-US" smtClean="0"/>
-              <a:t>12/8/15</a:t>
+              <a:t>12/9/15</a:t>
             </a:fld>
             <a:endParaRPr lang="en-US"/>
           </a:p>
@@ -3291,7 +3297,7 @@
           <a:p>
             <a:fld id="{7A0D676A-78C6-B44A-97A2-2446764EF6A7}" type="datetimeFigureOut">
               <a:rPr lang="en-US" smtClean="0"/>
-              <a:t>12/8/15</a:t>
+              <a:t>12/9/15</a:t>
             </a:fld>
             <a:endParaRPr lang="en-US"/>
           </a:p>
@@ -3471,7 +3477,7 @@
           <a:p>
             <a:fld id="{7A0D676A-78C6-B44A-97A2-2446764EF6A7}" type="datetimeFigureOut">
               <a:rPr lang="en-US" smtClean="0"/>
-              <a:t>12/8/15</a:t>
+              <a:t>12/9/15</a:t>
             </a:fld>
             <a:endParaRPr lang="en-US"/>
           </a:p>
@@ -3760,7 +3766,7 @@
           <a:p>
             <a:fld id="{7A0D676A-78C6-B44A-97A2-2446764EF6A7}" type="datetimeFigureOut">
               <a:rPr lang="en-US" smtClean="0"/>
-              <a:t>12/8/15</a:t>
+              <a:t>12/9/15</a:t>
             </a:fld>
             <a:endParaRPr lang="en-US"/>
           </a:p>
@@ -4002,7 +4008,7 @@
           <a:p>
             <a:fld id="{7A0D676A-78C6-B44A-97A2-2446764EF6A7}" type="datetimeFigureOut">
               <a:rPr lang="en-US" smtClean="0"/>
-              <a:t>12/8/15</a:t>
+              <a:t>12/9/15</a:t>
             </a:fld>
             <a:endParaRPr lang="en-US"/>
           </a:p>
@@ -4381,7 +4387,7 @@
           <a:p>
             <a:fld id="{7A0D676A-78C6-B44A-97A2-2446764EF6A7}" type="datetimeFigureOut">
               <a:rPr lang="en-US" smtClean="0"/>
-              <a:t>12/8/15</a:t>
+              <a:t>12/9/15</a:t>
             </a:fld>
             <a:endParaRPr lang="en-US"/>
           </a:p>
@@ -4499,7 +4505,7 @@
           <a:p>
             <a:fld id="{7A0D676A-78C6-B44A-97A2-2446764EF6A7}" type="datetimeFigureOut">
               <a:rPr lang="en-US" smtClean="0"/>
-              <a:t>12/8/15</a:t>
+              <a:t>12/9/15</a:t>
             </a:fld>
             <a:endParaRPr lang="en-US"/>
           </a:p>
@@ -4594,7 +4600,7 @@
           <a:p>
             <a:fld id="{7A0D676A-78C6-B44A-97A2-2446764EF6A7}" type="datetimeFigureOut">
               <a:rPr lang="en-US" smtClean="0"/>
-              <a:t>12/8/15</a:t>
+              <a:t>12/9/15</a:t>
             </a:fld>
             <a:endParaRPr lang="en-US"/>
           </a:p>
@@ -4843,7 +4849,7 @@
           <a:p>
             <a:fld id="{7A0D676A-78C6-B44A-97A2-2446764EF6A7}" type="datetimeFigureOut">
               <a:rPr lang="en-US" smtClean="0"/>
-              <a:t>12/8/15</a:t>
+              <a:t>12/9/15</a:t>
             </a:fld>
             <a:endParaRPr lang="en-US"/>
           </a:p>
@@ -5100,7 +5106,7 @@
           <a:p>
             <a:fld id="{7A0D676A-78C6-B44A-97A2-2446764EF6A7}" type="datetimeFigureOut">
               <a:rPr lang="en-US" smtClean="0"/>
-              <a:t>12/8/15</a:t>
+              <a:t>12/9/15</a:t>
             </a:fld>
             <a:endParaRPr lang="en-US"/>
           </a:p>
@@ -5343,7 +5349,7 @@
           <a:p>
             <a:fld id="{7A0D676A-78C6-B44A-97A2-2446764EF6A7}" type="datetimeFigureOut">
               <a:rPr lang="en-US" smtClean="0"/>
-              <a:t>12/8/15</a:t>
+              <a:t>12/9/15</a:t>
             </a:fld>
             <a:endParaRPr lang="en-US"/>
           </a:p>
@@ -6102,7 +6108,12 @@
             <p:ph type="title"/>
           </p:nvPr>
         </p:nvSpPr>
-        <p:spPr/>
+        <p:spPr>
+          <a:xfrm>
+            <a:off x="4372302" y="764373"/>
+            <a:ext cx="7133897" cy="1293028"/>
+          </a:xfrm>
+        </p:spPr>
         <p:txBody>
           <a:bodyPr>
             <a:normAutofit fontScale="90000"/>
@@ -6258,6 +6269,132 @@
             <p:ph type="title"/>
           </p:nvPr>
         </p:nvSpPr>
+        <p:spPr>
+          <a:xfrm>
+            <a:off x="3804744" y="764373"/>
+            <a:ext cx="7701455" cy="1293028"/>
+          </a:xfrm>
+        </p:spPr>
+        <p:txBody>
+          <a:bodyPr/>
+          <a:lstStyle/>
+          <a:p>
+            <a:r>
+              <a:rPr lang="en-US" dirty="0" smtClean="0"/>
+              <a:t>Our Enhancement: Searching All Resources</a:t>
+            </a:r>
+            <a:endParaRPr lang="en-US" dirty="0"/>
+          </a:p>
+        </p:txBody>
+      </p:sp>
+      <p:pic>
+        <p:nvPicPr>
+          <p:cNvPr id="5" name="Content Placeholder 4"/>
+          <p:cNvPicPr>
+            <a:picLocks noGrp="1" noChangeAspect="1"/>
+          </p:cNvPicPr>
+          <p:nvPr>
+            <p:ph sz="half" idx="1"/>
+          </p:nvPr>
+        </p:nvPicPr>
+        <p:blipFill>
+          <a:blip r:embed="rId2">
+            <a:extLst>
+              <a:ext uri="{28A0092B-C50C-407E-A947-70E740481C1C}">
+                <a14:useLocalDpi xmlns:a14="http://schemas.microsoft.com/office/drawing/2010/main" val="0"/>
+              </a:ext>
+            </a:extLst>
+          </a:blip>
+          <a:stretch>
+            <a:fillRect/>
+          </a:stretch>
+        </p:blipFill>
+        <p:spPr>
+          <a:xfrm>
+            <a:off x="685800" y="2263204"/>
+            <a:ext cx="5334000" cy="3885754"/>
+          </a:xfrm>
+        </p:spPr>
+      </p:pic>
+      <p:sp>
+        <p:nvSpPr>
+          <p:cNvPr id="4" name="Content Placeholder 3"/>
+          <p:cNvSpPr>
+            <a:spLocks noGrp="1"/>
+          </p:cNvSpPr>
+          <p:nvPr>
+            <p:ph sz="half" idx="2"/>
+          </p:nvPr>
+        </p:nvSpPr>
+        <p:spPr/>
+        <p:txBody>
+          <a:bodyPr/>
+          <a:lstStyle/>
+          <a:p>
+            <a:r>
+              <a:rPr lang="en-US" dirty="0" smtClean="0"/>
+              <a:t>Searching for all resources would be tedious with the already existing filter feature always.</a:t>
+            </a:r>
+          </a:p>
+          <a:p>
+            <a:r>
+              <a:rPr lang="en-US" dirty="0" smtClean="0"/>
+              <a:t>Imagine you wanted to show events where the location contains Connor (Connor’s House) or events with the name Connor (Connor Jackson). You’d have to click on quite a few rule boxes</a:t>
+            </a:r>
+            <a:r>
+              <a:rPr lang="is-IS" dirty="0" smtClean="0"/>
+              <a:t>…</a:t>
+            </a:r>
+          </a:p>
+          <a:p>
+            <a:r>
+              <a:rPr lang="is-IS" dirty="0" smtClean="0"/>
+              <a:t>But not anymore! We have a search all functionality built into the drop box as the first selection.</a:t>
+            </a:r>
+            <a:endParaRPr lang="en-US" dirty="0" smtClean="0"/>
+          </a:p>
+        </p:txBody>
+      </p:sp>
+    </p:spTree>
+    <p:extLst>
+      <p:ext uri="{BB962C8B-B14F-4D97-AF65-F5344CB8AC3E}">
+        <p14:creationId xmlns:p14="http://schemas.microsoft.com/office/powerpoint/2010/main" val="1419445176"/>
+      </p:ext>
+    </p:extLst>
+  </p:cSld>
+  <p:clrMapOvr>
+    <a:masterClrMapping/>
+  </p:clrMapOvr>
+</p:sld>
+</file>
+
+<file path=ppt/slides/slide14.xml><?xml version="1.0" encoding="utf-8"?>
+<p:sld xmlns:a="http://schemas.openxmlformats.org/drawingml/2006/main" xmlns:r="http://schemas.openxmlformats.org/officeDocument/2006/relationships" xmlns:p="http://schemas.openxmlformats.org/presentationml/2006/main">
+  <p:cSld>
+    <p:spTree>
+      <p:nvGrpSpPr>
+        <p:cNvPr id="1" name=""/>
+        <p:cNvGrpSpPr/>
+        <p:nvPr/>
+      </p:nvGrpSpPr>
+      <p:grpSpPr>
+        <a:xfrm>
+          <a:off x="0" y="0"/>
+          <a:ext cx="0" cy="0"/>
+          <a:chOff x="0" y="0"/>
+          <a:chExt cx="0" cy="0"/>
+        </a:xfrm>
+      </p:grpSpPr>
+      <p:sp>
+        <p:nvSpPr>
+          <p:cNvPr id="2" name="Title 1"/>
+          <p:cNvSpPr>
+            <a:spLocks noGrp="1"/>
+          </p:cNvSpPr>
+          <p:nvPr>
+            <p:ph type="title"/>
+          </p:nvPr>
+        </p:nvSpPr>
         <p:spPr/>
         <p:txBody>
           <a:bodyPr/>
@@ -6282,13 +6419,13 @@
             <a:spLocks noGrp="1"/>
           </p:cNvSpPr>
           <p:nvPr>
-            <p:ph sz="half" idx="1"/>
+            <p:ph idx="1"/>
           </p:nvPr>
         </p:nvSpPr>
         <p:spPr/>
         <p:txBody>
           <a:bodyPr>
-            <a:normAutofit fontScale="92500" lnSpcReduction="10000"/>
+            <a:normAutofit/>
           </a:bodyPr>
           <a:lstStyle/>
           <a:p>
@@ -6307,44 +6444,6 @@
             <a:r>
               <a:rPr lang="en-US" dirty="0" smtClean="0"/>
               <a:t>We figured that’s the most common type of search in a calendar application, so if we developed a proper search function, why not extend it to that?</a:t>
-            </a:r>
-            <a:endParaRPr lang="en-US" dirty="0"/>
-          </a:p>
-        </p:txBody>
-      </p:sp>
-      <p:sp>
-        <p:nvSpPr>
-          <p:cNvPr id="4" name="Content Placeholder 3"/>
-          <p:cNvSpPr>
-            <a:spLocks noGrp="1"/>
-          </p:cNvSpPr>
-          <p:nvPr>
-            <p:ph sz="half" idx="2"/>
-          </p:nvPr>
-        </p:nvSpPr>
-        <p:spPr/>
-        <p:txBody>
-          <a:bodyPr>
-            <a:normAutofit fontScale="92500" lnSpcReduction="10000"/>
-          </a:bodyPr>
-          <a:lstStyle/>
-          <a:p>
-            <a:r>
-              <a:rPr lang="en-US" dirty="0" smtClean="0"/>
-              <a:t>We also thought that it would be nice to implement a “search all” method, so that you could do a search on every type of resource simultaneously.</a:t>
-            </a:r>
-          </a:p>
-          <a:p>
-            <a:r>
-              <a:rPr lang="en-US" dirty="0" smtClean="0"/>
-              <a:t>Example: Search all, Claxton</a:t>
-            </a:r>
-          </a:p>
-          <a:p>
-            <a:pPr lvl="1"/>
-            <a:r>
-              <a:rPr lang="en-US" dirty="0" smtClean="0"/>
-              <a:t>This would consider locations that contain Claxton (maybe Adam Claxton’s house), people (Adam Claxton), goals (Meet with Adam Claxton) etc.</a:t>
             </a:r>
             <a:endParaRPr lang="en-US" dirty="0"/>
           </a:p>
@@ -6370,7 +6469,7 @@
 </p:sld>
 </file>
 
-<file path=ppt/slides/slide14.xml><?xml version="1.0" encoding="utf-8"?>
+<file path=ppt/slides/slide15.xml><?xml version="1.0" encoding="utf-8"?>
 <p:sld xmlns:a="http://schemas.openxmlformats.org/drawingml/2006/main" xmlns:r="http://schemas.openxmlformats.org/officeDocument/2006/relationships" xmlns:p="http://schemas.openxmlformats.org/presentationml/2006/main">
   <p:cSld>
     <p:spTree>
@@ -6479,7 +6578,7 @@
 </p:sld>
 </file>
 
-<file path=ppt/slides/slide15.xml><?xml version="1.0" encoding="utf-8"?>
+<file path=ppt/slides/slide16.xml><?xml version="1.0" encoding="utf-8"?>
 <p:sld xmlns:a="http://schemas.openxmlformats.org/drawingml/2006/main" xmlns:r="http://schemas.openxmlformats.org/officeDocument/2006/relationships" xmlns:p="http://schemas.openxmlformats.org/presentationml/2006/main">
   <p:cSld>
     <p:spTree>

</xml_diff>